<commit_message>
rewrite the layout and code
</commit_message>
<xml_diff>
--- a/Concept.pptx
+++ b/Concept.pptx
@@ -9,12 +9,13 @@
   </p:notesMasterIdLst>
   <p:sldIdLst>
     <p:sldId id="256" r:id="rId3"/>
-    <p:sldId id="259" r:id="rId4"/>
-    <p:sldId id="258" r:id="rId5"/>
-    <p:sldId id="257" r:id="rId6"/>
-    <p:sldId id="260" r:id="rId7"/>
+    <p:sldId id="258" r:id="rId4"/>
+    <p:sldId id="257" r:id="rId5"/>
+    <p:sldId id="260" r:id="rId6"/>
+    <p:sldId id="259" r:id="rId7"/>
+    <p:sldId id="261" r:id="rId8"/>
   </p:sldIdLst>
-  <p:sldSz cx="6858000" cy="9906000" type="A4"/>
+  <p:sldSz cx="9906000" cy="6858000" type="A4"/>
   <p:notesSz cx="6858000" cy="9144000"/>
   <p:defaultTextStyle>
     <a:defPPr>
@@ -156,14 +157,16 @@
           </a:prstGeom>
         </p:spPr>
         <p:txBody>
-          <a:bodyPr vert="horz" lIns="91440" tIns="45720" rIns="91440" bIns="45720" rtlCol="0"/>
+          <a:bodyPr vert="horz" lIns="91440" tIns="45720" rIns="91440" bIns="45720"/>
           <a:lstStyle>
             <a:lvl1pPr algn="l">
               <a:defRPr sz="1200"/>
             </a:lvl1pPr>
           </a:lstStyle>
           <a:p>
-            <a:pPr lvl="0"/>
+            <a:pPr lvl="0">
+              <a:defRPr/>
+            </a:pPr>
             <a:endParaRPr lang="ko-KR" altLang="en-US"/>
           </a:p>
         </p:txBody>
@@ -188,18 +191,22 @@
           </a:prstGeom>
         </p:spPr>
         <p:txBody>
-          <a:bodyPr vert="horz" lIns="91440" tIns="45720" rIns="91440" bIns="45720" rtlCol="0"/>
+          <a:bodyPr vert="horz" lIns="91440" tIns="45720" rIns="91440" bIns="45720"/>
           <a:lstStyle>
             <a:lvl1pPr algn="r">
               <a:defRPr sz="1200"/>
             </a:lvl1pPr>
           </a:lstStyle>
           <a:p>
-            <a:pPr lvl="0"/>
+            <a:pPr lvl="0">
+              <a:defRPr/>
+            </a:pPr>
             <a:fld id="{E2B2BC9D-A816-4D0A-858B-1D023B3A8ACA}" type="datetime1">
-              <a:rPr lang="ko-KR" altLang="en-US" smtClean="0"/>
-              <a:pPr/>
-              <a:t>2009-03-26</a:t>
+              <a:rPr lang="ko-KR" altLang="en-US"/>
+              <a:pPr lvl="0">
+                <a:defRPr/>
+              </a:pPr>
+              <a:t>2022-06-05</a:t>
             </a:fld>
             <a:endParaRPr lang="ko-KR" altLang="en-US"/>
           </a:p>
@@ -217,8 +224,8 @@
         </p:nvSpPr>
         <p:spPr>
           <a:xfrm>
-            <a:off x="2242038" y="685800"/>
-            <a:ext cx="2373923" cy="3429000"/>
+            <a:off x="952499" y="685800"/>
+            <a:ext cx="4953000" cy="3429000"/>
           </a:xfrm>
           <a:prstGeom prst="rect">
             <a:avLst/>
@@ -231,10 +238,12 @@
           </a:ln>
         </p:spPr>
         <p:txBody>
-          <a:bodyPr vert="horz" lIns="91440" tIns="45720" rIns="91440" bIns="45720" rtlCol="0" anchor="ctr"/>
+          <a:bodyPr vert="horz" lIns="91440" tIns="45720" rIns="91440" bIns="45720" anchor="ctr"/>
           <a:lstStyle/>
           <a:p>
-            <a:pPr lvl="0"/>
+            <a:pPr lvl="0">
+              <a:defRPr/>
+            </a:pPr>
             <a:endParaRPr lang="ko-KR" altLang="en-US"/>
           </a:p>
         </p:txBody>
@@ -335,14 +344,16 @@
           </a:prstGeom>
         </p:spPr>
         <p:txBody>
-          <a:bodyPr vert="horz" lIns="91440" tIns="45720" rIns="91440" bIns="45720" rtlCol="0" anchor="b"/>
+          <a:bodyPr vert="horz" lIns="91440" tIns="45720" rIns="91440" bIns="45720" anchor="b"/>
           <a:lstStyle>
             <a:lvl1pPr algn="l">
               <a:defRPr sz="1200"/>
             </a:lvl1pPr>
           </a:lstStyle>
           <a:p>
-            <a:pPr lvl="0"/>
+            <a:pPr lvl="0">
+              <a:defRPr/>
+            </a:pPr>
             <a:endParaRPr lang="ko-KR" altLang="en-US"/>
           </a:p>
         </p:txBody>
@@ -367,17 +378,21 @@
           </a:prstGeom>
         </p:spPr>
         <p:txBody>
-          <a:bodyPr vert="horz" lIns="91440" tIns="45720" rIns="91440" bIns="45720" rtlCol="0" anchor="b"/>
+          <a:bodyPr vert="horz" lIns="91440" tIns="45720" rIns="91440" bIns="45720" anchor="b"/>
           <a:lstStyle>
             <a:lvl1pPr algn="r">
               <a:defRPr sz="1200"/>
             </a:lvl1pPr>
           </a:lstStyle>
           <a:p>
-            <a:pPr lvl="0"/>
+            <a:pPr lvl="0">
+              <a:defRPr/>
+            </a:pPr>
             <a:fld id="{09F4262C-968C-4EE9-8164-CE16364706B3}" type="slidenum">
-              <a:rPr lang="ko-KR" altLang="en-US" smtClean="0"/>
-              <a:pPr/>
+              <a:rPr lang="ko-KR" altLang="en-US"/>
+              <a:pPr lvl="0">
+                <a:defRPr/>
+              </a:pPr>
               <a:t>‹#›</a:t>
             </a:fld>
             <a:endParaRPr lang="ko-KR" altLang="en-US"/>
@@ -682,6 +697,201 @@
 </p:notes>
 </file>
 
+<file path=ppt/notesSlides/notesSlide3.xml><?xml version="1.0" encoding="utf-8"?>
+<p:notes xmlns:r="http://schemas.openxmlformats.org/officeDocument/2006/relationships" xmlns:c="http://schemas.openxmlformats.org/drawingml/2006/chart" xmlns:a="http://schemas.openxmlformats.org/drawingml/2006/main" xmlns:dgm="http://schemas.openxmlformats.org/drawingml/2006/diagram" xmlns:dsp="http://schemas.microsoft.com/office/drawing/2008/diagram" xmlns:p="http://schemas.openxmlformats.org/presentationml/2006/main">
+  <p:cSld>
+    <p:spTree>
+      <p:nvGrpSpPr>
+        <p:cNvPr id="1" name=""/>
+        <p:cNvGrpSpPr/>
+        <p:nvPr/>
+      </p:nvGrpSpPr>
+      <p:grpSpPr>
+        <a:xfrm>
+          <a:off x="0" y="0"/>
+          <a:ext cx="0" cy="0"/>
+          <a:chOff x="0" y="0"/>
+          <a:chExt cx="0" cy="0"/>
+        </a:xfrm>
+      </p:grpSpPr>
+      <p:sp>
+        <p:nvSpPr>
+          <p:cNvPr id="2" name="슬라이드 이미지 개체 틀 3"/>
+          <p:cNvSpPr>
+            <a:spLocks noGrp="1" noRot="1" noChangeAspect="1" noTextEdit="1"/>
+          </p:cNvSpPr>
+          <p:nvPr>
+            <p:ph type="sldImg" idx="2"/>
+          </p:nvPr>
+        </p:nvSpPr>
+        <p:spPr/>
+        <p:txBody>
+          <a:bodyPr/>
+          <a:p>
+            <a:endParaRPr lang="ko-KR" altLang="en-US"/>
+          </a:p>
+        </p:txBody>
+      </p:sp>
+      <p:sp>
+        <p:nvSpPr>
+          <p:cNvPr id="3" name="슬라이드 노트 개체 틀 4"/>
+          <p:cNvSpPr>
+            <a:spLocks noGrp="1"/>
+          </p:cNvSpPr>
+          <p:nvPr>
+            <p:ph type="body" sz="quarter" idx="3"/>
+          </p:nvPr>
+        </p:nvSpPr>
+        <p:spPr/>
+        <p:txBody>
+          <a:bodyPr/>
+          <a:p>
+            <a:pPr lvl="0">
+              <a:defRPr/>
+            </a:pPr>
+            <a:r>
+              <a:rPr lang="en-US" altLang="ko-KR" b="1">
+                <a:solidFill>
+                  <a:schemeClr val="lt1"/>
+                </a:solidFill>
+              </a:rPr>
+              <a:t>1.</a:t>
+            </a:r>
+            <a:r>
+              <a:rPr lang="ko-KR" altLang="en-US" b="1">
+                <a:solidFill>
+                  <a:schemeClr val="lt1"/>
+                </a:solidFill>
+              </a:rPr>
+              <a:t> 랜딩페이지</a:t>
+            </a:r>
+            <a:endParaRPr lang="ko-KR" altLang="en-US" b="1">
+              <a:solidFill>
+                <a:schemeClr val="lt1"/>
+              </a:solidFill>
+            </a:endParaRPr>
+          </a:p>
+          <a:p>
+            <a:pPr lvl="0">
+              <a:defRPr/>
+            </a:pPr>
+            <a:endParaRPr lang="ko-KR" altLang="en-US">
+              <a:solidFill>
+                <a:schemeClr val="lt1"/>
+              </a:solidFill>
+            </a:endParaRPr>
+          </a:p>
+          <a:p>
+            <a:pPr lvl="0">
+              <a:defRPr/>
+            </a:pPr>
+            <a:r>
+              <a:rPr lang="en-US" altLang="ko-KR">
+                <a:solidFill>
+                  <a:schemeClr val="lt1"/>
+                </a:solidFill>
+              </a:rPr>
+              <a:t>- TITLE / font-family : Limelight</a:t>
+            </a:r>
+            <a:endParaRPr lang="en-US" altLang="ko-KR">
+              <a:solidFill>
+                <a:schemeClr val="lt1"/>
+              </a:solidFill>
+            </a:endParaRPr>
+          </a:p>
+          <a:p>
+            <a:pPr lvl="0">
+              <a:defRPr/>
+            </a:pPr>
+            <a:r>
+              <a:rPr lang="en-US" altLang="ko-KR">
+                <a:solidFill>
+                  <a:schemeClr val="lt1"/>
+                </a:solidFill>
+              </a:rPr>
+              <a:t>- Sub-title / font-family : Dubai</a:t>
+            </a:r>
+            <a:endParaRPr lang="en-US" altLang="ko-KR">
+              <a:solidFill>
+                <a:schemeClr val="lt1"/>
+              </a:solidFill>
+            </a:endParaRPr>
+          </a:p>
+          <a:p>
+            <a:pPr lvl="0">
+              <a:defRPr/>
+            </a:pPr>
+            <a:r>
+              <a:rPr lang="en-US" altLang="ko-KR">
+                <a:solidFill>
+                  <a:schemeClr val="lt1"/>
+                </a:solidFill>
+              </a:rPr>
+              <a:t>- NAV / menu bar, user profile</a:t>
+            </a:r>
+            <a:endParaRPr lang="en-US" altLang="ko-KR">
+              <a:solidFill>
+                <a:schemeClr val="lt1"/>
+              </a:solidFill>
+            </a:endParaRPr>
+          </a:p>
+          <a:p>
+            <a:pPr lvl="0">
+              <a:defRPr/>
+            </a:pPr>
+            <a:r>
+              <a:rPr lang="en-US" altLang="ko-KR">
+                <a:solidFill>
+                  <a:schemeClr val="lt1"/>
+                </a:solidFill>
+              </a:rPr>
+              <a:t>- bottom scrolling animation</a:t>
+            </a:r>
+            <a:endParaRPr lang="en-US" altLang="ko-KR">
+              <a:solidFill>
+                <a:schemeClr val="lt1"/>
+              </a:solidFill>
+            </a:endParaRPr>
+          </a:p>
+        </p:txBody>
+      </p:sp>
+      <p:sp>
+        <p:nvSpPr>
+          <p:cNvPr id="4" name="슬라이드 번호 개체 틀 6"/>
+          <p:cNvSpPr>
+            <a:spLocks noGrp="1"/>
+          </p:cNvSpPr>
+          <p:nvPr>
+            <p:ph type="sldNum" sz="quarter" idx="5"/>
+          </p:nvPr>
+        </p:nvSpPr>
+        <p:spPr/>
+        <p:txBody>
+          <a:bodyPr/>
+          <a:p>
+            <a:pPr lvl="0"/>
+            <a:fld id="{09F4262C-968C-4EE9-8164-CE16364706B3}" type="slidenum">
+              <a:rPr lang="ko-KR" altLang="en-US" smtClean="0"/>
+              <a:pPr/>
+              <a:t>5</a:t>
+            </a:fld>
+            <a:endParaRPr lang="ko-KR" altLang="en-US"/>
+          </a:p>
+        </p:txBody>
+      </p:sp>
+    </p:spTree>
+    <p:extLst>
+      <p:ext uri="{BB962C8B-B14F-4D97-AF65-F5344CB8AC3E}">
+        <p14:creationId xmlns:p14="http://schemas.microsoft.com/office/powerpoint/2010/main" val="1006207525"/>
+      </p:ext>
+    </p:extLst>
+  </p:cSld>
+  <p:clrMapOvr>
+    <a:masterClrMapping/>
+  </p:clrMapOvr>
+</p:notes>
+</file>
+
 <file path=ppt/slideLayouts/slideLayout1.xml><?xml version="1.0" encoding="utf-8"?>
 <p:sldLayout xmlns:r="http://schemas.openxmlformats.org/officeDocument/2006/relationships" xmlns:c="http://schemas.openxmlformats.org/drawingml/2006/chart" xmlns:a="http://schemas.openxmlformats.org/drawingml/2006/main" xmlns:dgm="http://schemas.openxmlformats.org/drawingml/2006/diagram" xmlns:dsp="http://schemas.microsoft.com/office/drawing/2008/diagram" xmlns:p="http://schemas.openxmlformats.org/presentationml/2006/main" showMasterPhAnim="1" matchingName="제목 슬라이드" type="title" preserve="1">
   <p:cSld name="제목 슬라이드">
@@ -3550,7 +3760,7 @@
       </p:ext>
     </p:extLst>
   </p:cSld>
-  <p:clrMap bg1="lt1" tx1="dk1" bg2="lt2" tx2="dk2" accent1="accent1" accent2="accent2" accent3="accent3" accent4="accent4" accent5="accent5" accent6="accent6" hlink="hlink" folHlink="folHlink"/>
+  <p:clrMap bg1="dk1" tx1="lt1" bg2="dk2" tx2="lt2" accent1="accent1" accent2="accent2" accent3="accent3" accent4="accent4" accent5="accent5" accent6="accent6" hlink="hlink" folHlink="folHlink"/>
   <p:sldLayoutIdLst>
     <p:sldLayoutId id="2147483649" r:id="rId1"/>
     <p:sldLayoutId id="2147483650" r:id="rId2"/>
@@ -4048,8 +4258,8 @@
         </p:nvSpPr>
         <p:spPr>
           <a:xfrm>
-            <a:off x="0" y="1970579"/>
-            <a:ext cx="6858000" cy="7457266"/>
+            <a:off x="2579076" y="1364246"/>
+            <a:ext cx="4747847" cy="8473174"/>
           </a:xfrm>
           <a:prstGeom prst="rect">
             <a:avLst/>
@@ -4071,7 +4281,7 @@
               <a:rPr lang="en-US" altLang="ko-KR" sz="1100"/>
               <a:t>.</a:t>
             </a:r>
-            <a:endParaRPr lang="ko-KR" altLang="en-US" sz="1100"/>
+            <a:endParaRPr lang="en-US" altLang="ko-KR" sz="1100"/>
           </a:p>
           <a:p>
             <a:pPr lvl="0">
@@ -4085,7 +4295,7 @@
               <a:rPr lang="en-US" altLang="ko-KR" sz="1100"/>
               <a:t>?</a:t>
             </a:r>
-            <a:endParaRPr lang="ko-KR" altLang="en-US" sz="1100"/>
+            <a:endParaRPr lang="en-US" altLang="ko-KR" sz="1100"/>
           </a:p>
           <a:p>
             <a:pPr lvl="0">
@@ -4105,7 +4315,7 @@
               <a:rPr lang="en-US" altLang="ko-KR" sz="1100"/>
               <a:t>?</a:t>
             </a:r>
-            <a:endParaRPr lang="ko-KR" altLang="en-US" sz="1100"/>
+            <a:endParaRPr lang="en-US" altLang="ko-KR" sz="1100"/>
           </a:p>
           <a:p>
             <a:pPr lvl="0">
@@ -4746,134 +4956,6 @@
             <a:avLst/>
           </a:prstGeom>
           <a:solidFill>
-            <a:srgbClr val="000000">
-              <a:alpha val="100000"/>
-            </a:srgbClr>
-          </a:solidFill>
-          <a:ln w="19050" cap="flat" cmpd="sng" algn="ctr">
-            <a:noFill/>
-            <a:prstDash val="solid"/>
-          </a:ln>
-        </p:spPr>
-        <p:txBody>
-          <a:bodyPr anchor="ctr"/>
-          <a:p>
-            <a:pPr marL="0" lvl="0" indent="0" algn="ctr" defTabSz="914400" rtl="0" eaLnBrk="1" latinLnBrk="1" hangingPunct="1">
-              <a:lnSpc>
-                <a:spcPct val="100000"/>
-              </a:lnSpc>
-              <a:spcBef>
-                <a:spcPct val="0"/>
-              </a:spcBef>
-              <a:spcAft>
-                <a:spcPts val="0"/>
-              </a:spcAft>
-              <a:buNone/>
-              <a:defRPr/>
-            </a:pPr>
-            <a:endParaRPr xmlns:mc="http://schemas.openxmlformats.org/markup-compatibility/2006" xmlns:hp="http://schemas.haansoft.com/office/presentation/8.0" kumimoji="0" lang="ko-KR" altLang="en-US" sz="1800" b="0" i="0" u="none" strike="noStrike" kern="1200" cap="none" spc="0" normalizeH="0" baseline="0" mc:Ignorable="hp" hp:hslEmbossed="0">
-              <a:solidFill>
-                <a:srgbClr val="ffffff"/>
-              </a:solidFill>
-              <a:latin typeface="Calibri"/>
-              <a:ea typeface="맑은 고딕"/>
-              <a:cs typeface="맑은 고딕"/>
-            </a:endParaRPr>
-          </a:p>
-        </p:txBody>
-      </p:sp>
-      <p:sp>
-        <p:nvSpPr>
-          <p:cNvPr id="5" name=""/>
-          <p:cNvSpPr txBox="1"/>
-          <p:nvPr/>
-        </p:nvSpPr>
-        <p:spPr>
-          <a:xfrm>
-            <a:off x="2752760" y="4769933"/>
-            <a:ext cx="1352480" cy="495487"/>
-          </a:xfrm>
-          <a:prstGeom prst="rect">
-            <a:avLst/>
-          </a:prstGeom>
-        </p:spPr>
-        <p:txBody>
-          <a:bodyPr wrap="none">
-            <a:spAutoFit/>
-          </a:bodyPr>
-          <a:p>
-            <a:pPr lvl="0">
-              <a:defRPr/>
-            </a:pPr>
-            <a:r>
-              <a:rPr lang="en-US" altLang="ko-KR" sz="2700" b="1">
-                <a:solidFill>
-                  <a:schemeClr val="lt1"/>
-                </a:solidFill>
-              </a:rPr>
-              <a:t>musicor</a:t>
-            </a:r>
-            <a:endParaRPr lang="en-US" altLang="ko-KR" sz="2700" b="1">
-              <a:solidFill>
-                <a:schemeClr val="lt1"/>
-              </a:solidFill>
-            </a:endParaRPr>
-          </a:p>
-        </p:txBody>
-      </p:sp>
-    </p:spTree>
-    <p:extLst>
-      <p:ext uri="{BB962C8B-B14F-4D97-AF65-F5344CB8AC3E}">
-        <p14:creationId xmlns:p14="http://schemas.microsoft.com/office/powerpoint/2010/main" val="3555258107"/>
-      </p:ext>
-    </p:extLst>
-  </p:cSld>
-  <p:clrMapOvr>
-    <a:masterClrMapping/>
-  </p:clrMapOvr>
-  <mc:AlternateContent xmlns:mc="http://schemas.openxmlformats.org/markup-compatibility/2006">
-    <mc:Choice xmlns:p14="http://schemas.microsoft.com/office/powerpoint/2010/main" Requires="p14">
-      <p:transition xmlns:mc="http://schemas.openxmlformats.org/markup-compatibility/2006" xmlns:p14="http://schemas.microsoft.com/office/powerpoint/2010/main" mc:Ignorable="p14" p14:dur="500"/>
-    </mc:Choice>
-    <mc:Fallback>
-      <p:transition/>
-    </mc:Fallback>
-  </mc:AlternateContent>
-</p:sld>
-</file>
-
-<file path=ppt/slides/slide3.xml><?xml version="1.0" encoding="utf-8"?>
-<p:sld xmlns:r="http://schemas.openxmlformats.org/officeDocument/2006/relationships" xmlns:c="http://schemas.openxmlformats.org/drawingml/2006/chart" xmlns:a="http://schemas.openxmlformats.org/drawingml/2006/main" xmlns:dgm="http://schemas.openxmlformats.org/drawingml/2006/diagram" xmlns:dsp="http://schemas.microsoft.com/office/drawing/2008/diagram" xmlns:p="http://schemas.openxmlformats.org/presentationml/2006/main">
-  <p:cSld>
-    <p:spTree>
-      <p:nvGrpSpPr>
-        <p:cNvPr id="1" name=""/>
-        <p:cNvGrpSpPr/>
-        <p:nvPr/>
-      </p:nvGrpSpPr>
-      <p:grpSpPr>
-        <a:xfrm>
-          <a:off x="0" y="0"/>
-          <a:ext cx="0" cy="0"/>
-          <a:chOff x="0" y="0"/>
-          <a:chExt cx="0" cy="0"/>
-        </a:xfrm>
-      </p:grpSpPr>
-      <p:sp>
-        <p:nvSpPr>
-          <p:cNvPr id="4" name=""/>
-          <p:cNvSpPr/>
-          <p:nvPr/>
-        </p:nvSpPr>
-        <p:spPr>
-          <a:xfrm>
-            <a:off x="0" y="0"/>
-            <a:ext cx="6858000" cy="9906000"/>
-          </a:xfrm>
-          <a:prstGeom prst="rect">
-            <a:avLst/>
-          </a:prstGeom>
-          <a:solidFill>
             <a:schemeClr val="dk1"/>
           </a:solidFill>
           <a:ln>
@@ -4939,15 +5021,15 @@
         </p:nvSpPr>
         <p:spPr>
           <a:xfrm>
-            <a:off x="4196078" y="310575"/>
-            <a:ext cx="2434592" cy="261507"/>
+            <a:off x="4631613" y="173548"/>
+            <a:ext cx="2217861" cy="259332"/>
           </a:xfrm>
           <a:prstGeom prst="rect">
             <a:avLst/>
           </a:prstGeom>
         </p:spPr>
         <p:txBody>
-          <a:bodyPr wrap="square">
+          <a:bodyPr wrap="none">
             <a:spAutoFit/>
           </a:bodyPr>
           <a:p>
@@ -5027,8 +5109,8 @@
         </p:nvSpPr>
         <p:spPr>
           <a:xfrm>
-            <a:off x="3988645" y="310575"/>
-            <a:ext cx="207433" cy="207433"/>
+            <a:off x="4488007" y="173548"/>
+            <a:ext cx="143607" cy="143607"/>
           </a:xfrm>
           <a:prstGeom prst="ellipse">
             <a:avLst/>
@@ -5044,7 +5126,7 @@
           </a:ln>
         </p:spPr>
         <p:txBody>
-          <a:bodyPr anchor="ctr"/>
+          <a:bodyPr wrap="none" anchor="ctr"/>
           <a:p>
             <a:pPr marL="0" lvl="0" indent="0" algn="ctr" defTabSz="914400" rtl="0" eaLnBrk="1" latinLnBrk="1" hangingPunct="1">
               <a:lnSpc>
@@ -5059,7 +5141,7 @@
               <a:buNone/>
               <a:defRPr/>
             </a:pPr>
-            <a:endParaRPr xmlns:mc="http://schemas.openxmlformats.org/markup-compatibility/2006" xmlns:hp="http://schemas.haansoft.com/office/presentation/8.0" kumimoji="0" lang="ko-KR" altLang="en-US" sz="1800" b="0" i="0" u="none" strike="noStrike" kern="1200" cap="none" spc="0" normalizeH="0" baseline="0" mc:Ignorable="hp" hp:hslEmbossed="0">
+            <a:endParaRPr xmlns:mc="http://schemas.openxmlformats.org/markup-compatibility/2006" xmlns:hp="http://schemas.haansoft.com/office/presentation/8.0" kumimoji="0" lang="ko-KR" altLang="en-US" b="0" i="0" u="none" strike="noStrike" kern="1200" cap="none" spc="0" normalizeH="0" baseline="0" mc:Ignorable="hp" hp:hslEmbossed="0">
               <a:solidFill>
                 <a:srgbClr val="ffffff"/>
               </a:solidFill>
@@ -5078,15 +5160,15 @@
         </p:nvSpPr>
         <p:spPr>
           <a:xfrm>
-            <a:off x="1851196" y="1295361"/>
-            <a:ext cx="2434592" cy="261507"/>
+            <a:off x="3860673" y="896788"/>
+            <a:ext cx="2317241" cy="253832"/>
           </a:xfrm>
           <a:prstGeom prst="rect">
             <a:avLst/>
           </a:prstGeom>
         </p:spPr>
         <p:txBody>
-          <a:bodyPr wrap="square">
+          <a:bodyPr wrap="none">
             <a:spAutoFit/>
           </a:bodyPr>
           <a:p>
@@ -5144,8 +5226,8 @@
         </p:nvSpPr>
         <p:spPr>
           <a:xfrm>
-            <a:off x="1889296" y="1021252"/>
-            <a:ext cx="207433" cy="207433"/>
+            <a:off x="3887051" y="707020"/>
+            <a:ext cx="143607" cy="143607"/>
           </a:xfrm>
           <a:prstGeom prst="ellipse">
             <a:avLst/>
@@ -5161,7 +5243,7 @@
           </a:ln>
         </p:spPr>
         <p:txBody>
-          <a:bodyPr anchor="ctr"/>
+          <a:bodyPr wrap="none" anchor="ctr"/>
           <a:p>
             <a:pPr marL="0" lvl="0" indent="0" algn="ctr" defTabSz="914400" rtl="0" eaLnBrk="1" latinLnBrk="1" hangingPunct="1">
               <a:lnSpc>
@@ -5176,7 +5258,7 @@
               <a:buNone/>
               <a:defRPr/>
             </a:pPr>
-            <a:endParaRPr xmlns:mc="http://schemas.openxmlformats.org/markup-compatibility/2006" xmlns:hp="http://schemas.haansoft.com/office/presentation/8.0" kumimoji="0" lang="ko-KR" altLang="en-US" sz="1800" b="0" i="0" u="none" strike="noStrike" kern="1200" cap="none" spc="0" normalizeH="0" baseline="0" mc:Ignorable="hp" hp:hslEmbossed="0">
+            <a:endParaRPr xmlns:mc="http://schemas.openxmlformats.org/markup-compatibility/2006" xmlns:hp="http://schemas.haansoft.com/office/presentation/8.0" kumimoji="0" lang="ko-KR" altLang="en-US" b="0" i="0" u="none" strike="noStrike" kern="1200" cap="none" spc="0" normalizeH="0" baseline="0" mc:Ignorable="hp" hp:hslEmbossed="0">
               <a:solidFill>
                 <a:srgbClr val="ffffff"/>
               </a:solidFill>
@@ -5195,15 +5277,15 @@
         </p:nvSpPr>
         <p:spPr>
           <a:xfrm>
-            <a:off x="3134108" y="4076179"/>
-            <a:ext cx="2434592" cy="261507"/>
+            <a:off x="4748844" y="2821970"/>
+            <a:ext cx="1086170" cy="262225"/>
           </a:xfrm>
           <a:prstGeom prst="rect">
             <a:avLst/>
           </a:prstGeom>
         </p:spPr>
         <p:txBody>
-          <a:bodyPr wrap="square">
+          <a:bodyPr wrap="none">
             <a:spAutoFit/>
           </a:bodyPr>
           <a:p>
@@ -5261,8 +5343,8 @@
         </p:nvSpPr>
         <p:spPr>
           <a:xfrm>
-            <a:off x="2964775" y="4093691"/>
-            <a:ext cx="207433" cy="207433"/>
+            <a:off x="4631613" y="2834093"/>
+            <a:ext cx="143607" cy="143607"/>
           </a:xfrm>
           <a:prstGeom prst="ellipse">
             <a:avLst/>
@@ -5278,7 +5360,7 @@
           </a:ln>
         </p:spPr>
         <p:txBody>
-          <a:bodyPr anchor="ctr"/>
+          <a:bodyPr wrap="none" anchor="ctr"/>
           <a:p>
             <a:pPr marL="0" lvl="0" indent="0" algn="ctr" defTabSz="914400" rtl="0" eaLnBrk="1" latinLnBrk="1" hangingPunct="1">
               <a:lnSpc>
@@ -5293,7 +5375,7 @@
               <a:buNone/>
               <a:defRPr/>
             </a:pPr>
-            <a:endParaRPr xmlns:mc="http://schemas.openxmlformats.org/markup-compatibility/2006" xmlns:hp="http://schemas.haansoft.com/office/presentation/8.0" kumimoji="0" lang="ko-KR" altLang="en-US" sz="1800" b="0" i="0" u="none" strike="noStrike" kern="1200" cap="none" spc="0" normalizeH="0" baseline="0" mc:Ignorable="hp" hp:hslEmbossed="0">
+            <a:endParaRPr xmlns:mc="http://schemas.openxmlformats.org/markup-compatibility/2006" xmlns:hp="http://schemas.haansoft.com/office/presentation/8.0" kumimoji="0" lang="ko-KR" altLang="en-US" b="0" i="0" u="none" strike="noStrike" kern="1200" cap="none" spc="0" normalizeH="0" baseline="0" mc:Ignorable="hp" hp:hslEmbossed="0">
               <a:solidFill>
                 <a:srgbClr val="ffffff"/>
               </a:solidFill>
@@ -5325,7 +5407,7 @@
 </p:sld>
 </file>
 
-<file path=ppt/slides/slide4.xml><?xml version="1.0" encoding="utf-8"?>
+<file path=ppt/slides/slide3.xml><?xml version="1.0" encoding="utf-8"?>
 <p:sld xmlns:r="http://schemas.openxmlformats.org/officeDocument/2006/relationships" xmlns:c="http://schemas.openxmlformats.org/drawingml/2006/chart" xmlns:a="http://schemas.openxmlformats.org/drawingml/2006/main" xmlns:dgm="http://schemas.openxmlformats.org/drawingml/2006/diagram" xmlns:dsp="http://schemas.microsoft.com/office/drawing/2008/diagram" xmlns:p="http://schemas.openxmlformats.org/presentationml/2006/main">
   <p:cSld>
     <p:spTree>
@@ -5446,15 +5528,15 @@
         </p:nvSpPr>
         <p:spPr>
           <a:xfrm>
-            <a:off x="4100616" y="320144"/>
-            <a:ext cx="2434592" cy="421959"/>
+            <a:off x="4953000" y="124852"/>
+            <a:ext cx="2322049" cy="424157"/>
           </a:xfrm>
           <a:prstGeom prst="rect">
             <a:avLst/>
           </a:prstGeom>
         </p:spPr>
         <p:txBody>
-          <a:bodyPr wrap="square">
+          <a:bodyPr wrap="none">
             <a:spAutoFit/>
           </a:bodyPr>
           <a:p>
@@ -5511,8 +5593,8 @@
         </p:nvSpPr>
         <p:spPr>
           <a:xfrm>
-            <a:off x="3893183" y="427407"/>
-            <a:ext cx="207433" cy="207433"/>
+            <a:off x="4809392" y="199111"/>
+            <a:ext cx="143607" cy="143607"/>
           </a:xfrm>
           <a:prstGeom prst="ellipse">
             <a:avLst/>
@@ -5541,7 +5623,7 @@
           </a:fontRef>
         </p:style>
         <p:txBody>
-          <a:bodyPr anchor="ctr"/>
+          <a:bodyPr wrap="none" anchor="ctr"/>
           <a:p>
             <a:pPr lvl="0" algn="ctr">
               <a:defRPr/>
@@ -5558,15 +5640,15 @@
         </p:nvSpPr>
         <p:spPr>
           <a:xfrm>
-            <a:off x="4308050" y="1742544"/>
-            <a:ext cx="2434592" cy="417726"/>
+            <a:off x="5681882" y="1213996"/>
+            <a:ext cx="1645041" cy="420494"/>
           </a:xfrm>
           <a:prstGeom prst="rect">
             <a:avLst/>
           </a:prstGeom>
         </p:spPr>
         <p:txBody>
-          <a:bodyPr wrap="square">
+          <a:bodyPr wrap="none">
             <a:spAutoFit/>
           </a:bodyPr>
           <a:p>
@@ -5669,8 +5751,8 @@
         </p:nvSpPr>
         <p:spPr>
           <a:xfrm>
-            <a:off x="4100616" y="1849807"/>
-            <a:ext cx="207433" cy="207433"/>
+            <a:off x="5417965" y="1280635"/>
+            <a:ext cx="143607" cy="143607"/>
           </a:xfrm>
           <a:prstGeom prst="ellipse">
             <a:avLst/>
@@ -5686,7 +5768,7 @@
           </a:ln>
         </p:spPr>
         <p:txBody>
-          <a:bodyPr anchor="ctr"/>
+          <a:bodyPr wrap="none" anchor="ctr"/>
           <a:p>
             <a:pPr marL="0" lvl="0" indent="0" algn="ctr" defTabSz="914400" rtl="0" eaLnBrk="1" latinLnBrk="1" hangingPunct="1">
               <a:lnSpc>
@@ -5720,15 +5802,15 @@
         </p:nvSpPr>
         <p:spPr>
           <a:xfrm>
-            <a:off x="378985" y="1146832"/>
-            <a:ext cx="2910843" cy="260963"/>
+            <a:off x="3042285" y="549009"/>
+            <a:ext cx="1719115" cy="423336"/>
           </a:xfrm>
           <a:prstGeom prst="rect">
             <a:avLst/>
           </a:prstGeom>
         </p:spPr>
         <p:txBody>
-          <a:bodyPr wrap="square">
+          <a:bodyPr wrap="none">
             <a:spAutoFit/>
           </a:bodyPr>
           <a:p>
@@ -5765,7 +5847,41 @@
                 <a:ea typeface="맑은 고딕"/>
                 <a:cs typeface="맑은 고딕"/>
               </a:rPr>
-              <a:t>하여 여닫을 수 있는 </a:t>
+              <a:t>하여</a:t>
+            </a:r>
+            <a:endParaRPr xmlns:mc="http://schemas.openxmlformats.org/markup-compatibility/2006" xmlns:hp="http://schemas.haansoft.com/office/presentation/8.0" kumimoji="0" lang="ko-KR" altLang="en-US" sz="1100" b="0" i="0" u="none" strike="noStrike" kern="1200" cap="none" spc="0" normalizeH="0" baseline="0" mc:Ignorable="hp" hp:hslEmbossed="0">
+              <a:solidFill>
+                <a:srgbClr val="ffffff"/>
+              </a:solidFill>
+              <a:latin typeface="Calibri"/>
+              <a:ea typeface="맑은 고딕"/>
+              <a:cs typeface="맑은 고딕"/>
+            </a:endParaRPr>
+          </a:p>
+          <a:p>
+            <a:pPr marL="0" lvl="0" indent="0" algn="r" defTabSz="914400" rtl="0" eaLnBrk="1" latinLnBrk="1" hangingPunct="1">
+              <a:lnSpc>
+                <a:spcPct val="100000"/>
+              </a:lnSpc>
+              <a:spcBef>
+                <a:spcPct val="0"/>
+              </a:spcBef>
+              <a:spcAft>
+                <a:spcPts val="0"/>
+              </a:spcAft>
+              <a:buNone/>
+              <a:defRPr/>
+            </a:pPr>
+            <a:r>
+              <a:rPr xmlns:mc="http://schemas.openxmlformats.org/markup-compatibility/2006" xmlns:hp="http://schemas.haansoft.com/office/presentation/8.0" kumimoji="0" lang="ko-KR" altLang="en-US" sz="1100" b="0" i="0" u="none" strike="noStrike" kern="1200" cap="none" spc="0" normalizeH="0" baseline="0" mc:Ignorable="hp" hp:hslEmbossed="0">
+                <a:solidFill>
+                  <a:srgbClr val="ffffff"/>
+                </a:solidFill>
+                <a:latin typeface="Calibri"/>
+                <a:ea typeface="맑은 고딕"/>
+                <a:cs typeface="맑은 고딕"/>
+              </a:rPr>
+              <a:t>여닫을 수 있는 </a:t>
             </a:r>
             <a:r>
               <a:rPr xmlns:mc="http://schemas.openxmlformats.org/markup-compatibility/2006" xmlns:hp="http://schemas.haansoft.com/office/presentation/8.0" kumimoji="0" lang="en-US" altLang="ko-KR" sz="1100" b="0" i="0" u="none" strike="noStrike" kern="1200" cap="none" spc="0" normalizeH="0" baseline="0" mc:Ignorable="hp" hp:hslEmbossed="0">
@@ -5797,8 +5913,8 @@
         </p:nvSpPr>
         <p:spPr>
           <a:xfrm>
-            <a:off x="3325283" y="1197066"/>
-            <a:ext cx="207433" cy="207433"/>
+            <a:off x="4881196" y="828738"/>
+            <a:ext cx="143607" cy="143607"/>
           </a:xfrm>
           <a:prstGeom prst="ellipse">
             <a:avLst/>
@@ -5814,7 +5930,7 @@
           </a:ln>
         </p:spPr>
         <p:txBody>
-          <a:bodyPr anchor="ctr"/>
+          <a:bodyPr wrap="none" anchor="ctr"/>
           <a:p>
             <a:pPr marL="0" lvl="0" indent="0" algn="ctr" defTabSz="914400" rtl="0" eaLnBrk="1" latinLnBrk="1" hangingPunct="1">
               <a:lnSpc>
@@ -5848,15 +5964,15 @@
         </p:nvSpPr>
         <p:spPr>
           <a:xfrm>
-            <a:off x="4308050" y="5126025"/>
-            <a:ext cx="2434592" cy="415620"/>
+            <a:off x="4381498" y="3548786"/>
+            <a:ext cx="2216541" cy="421234"/>
           </a:xfrm>
           <a:prstGeom prst="rect">
             <a:avLst/>
           </a:prstGeom>
         </p:spPr>
         <p:txBody>
-          <a:bodyPr wrap="square">
+          <a:bodyPr wrap="none">
             <a:spAutoFit/>
           </a:bodyPr>
           <a:p>
@@ -5959,8 +6075,8 @@
         </p:nvSpPr>
         <p:spPr>
           <a:xfrm>
-            <a:off x="4100616" y="5233289"/>
-            <a:ext cx="207433" cy="207433"/>
+            <a:off x="4237890" y="3623047"/>
+            <a:ext cx="143607" cy="143607"/>
           </a:xfrm>
           <a:prstGeom prst="ellipse">
             <a:avLst/>
@@ -5976,7 +6092,7 @@
           </a:ln>
         </p:spPr>
         <p:txBody>
-          <a:bodyPr anchor="ctr"/>
+          <a:bodyPr wrap="none" anchor="ctr"/>
           <a:p>
             <a:pPr marL="0" lvl="0" indent="0" algn="ctr" defTabSz="914400" rtl="0" eaLnBrk="1" latinLnBrk="1" hangingPunct="1">
               <a:lnSpc>
@@ -6006,6 +6122,93 @@
     <p:extLst>
       <p:ext uri="{BB962C8B-B14F-4D97-AF65-F5344CB8AC3E}">
         <p14:creationId xmlns:p14="http://schemas.microsoft.com/office/powerpoint/2010/main" val="2904218301"/>
+      </p:ext>
+    </p:extLst>
+  </p:cSld>
+  <p:clrMapOvr>
+    <a:masterClrMapping/>
+  </p:clrMapOvr>
+  <mc:AlternateContent xmlns:mc="http://schemas.openxmlformats.org/markup-compatibility/2006">
+    <mc:Choice xmlns:p14="http://schemas.microsoft.com/office/powerpoint/2010/main" Requires="p14">
+      <p:transition xmlns:mc="http://schemas.openxmlformats.org/markup-compatibility/2006" xmlns:p14="http://schemas.microsoft.com/office/powerpoint/2010/main" mc:Ignorable="p14" p14:dur="500"/>
+    </mc:Choice>
+    <mc:Fallback>
+      <p:transition/>
+    </mc:Fallback>
+  </mc:AlternateContent>
+</p:sld>
+</file>
+
+<file path=ppt/slides/slide4.xml><?xml version="1.0" encoding="utf-8"?>
+<p:sld xmlns:r="http://schemas.openxmlformats.org/officeDocument/2006/relationships" xmlns:c="http://schemas.openxmlformats.org/drawingml/2006/chart" xmlns:a="http://schemas.openxmlformats.org/drawingml/2006/main" xmlns:dgm="http://schemas.openxmlformats.org/drawingml/2006/diagram" xmlns:dsp="http://schemas.microsoft.com/office/drawing/2008/diagram" xmlns:p="http://schemas.openxmlformats.org/presentationml/2006/main">
+  <p:cSld>
+    <p:spTree>
+      <p:nvGrpSpPr>
+        <p:cNvPr id="1" name=""/>
+        <p:cNvGrpSpPr/>
+        <p:nvPr/>
+      </p:nvGrpSpPr>
+      <p:grpSpPr>
+        <a:xfrm>
+          <a:off x="0" y="0"/>
+          <a:ext cx="0" cy="0"/>
+          <a:chOff x="0" y="0"/>
+          <a:chExt cx="0" cy="0"/>
+        </a:xfrm>
+      </p:grpSpPr>
+      <p:sp>
+        <p:nvSpPr>
+          <p:cNvPr id="2" name="제목 1"/>
+          <p:cNvSpPr>
+            <a:spLocks noGrp="1"/>
+          </p:cNvSpPr>
+          <p:nvPr>
+            <p:ph type="title" idx="0"/>
+          </p:nvPr>
+        </p:nvSpPr>
+        <p:spPr/>
+        <p:txBody>
+          <a:bodyPr/>
+          <a:p>
+            <a:pPr lvl="0">
+              <a:defRPr/>
+            </a:pPr>
+            <a:r>
+              <a:rPr lang="en-US" altLang="ko-KR"/>
+              <a:t>Color Psychology</a:t>
+            </a:r>
+            <a:endParaRPr lang="en-US" altLang="ko-KR"/>
+          </a:p>
+        </p:txBody>
+      </p:sp>
+      <p:pic>
+        <p:nvPicPr>
+          <p:cNvPr id="5" name=""/>
+          <p:cNvPicPr>
+            <a:picLocks noChangeAspect="1"/>
+          </p:cNvPicPr>
+          <p:nvPr/>
+        </p:nvPicPr>
+        <p:blipFill rotWithShape="1">
+          <a:blip r:embed="rId2"/>
+          <a:stretch>
+            <a:fillRect/>
+          </a:stretch>
+        </p:blipFill>
+        <p:spPr>
+          <a:xfrm>
+            <a:off x="0" y="1083468"/>
+            <a:ext cx="6858000" cy="5143500"/>
+          </a:xfrm>
+          <a:prstGeom prst="rect">
+            <a:avLst/>
+          </a:prstGeom>
+        </p:spPr>
+      </p:pic>
+    </p:spTree>
+    <p:extLst>
+      <p:ext uri="{BB962C8B-B14F-4D97-AF65-F5344CB8AC3E}">
+        <p14:creationId xmlns:p14="http://schemas.microsoft.com/office/powerpoint/2010/main" val="1420474615"/>
       </p:ext>
     </p:extLst>
   </p:cSld>
@@ -6040,59 +6243,619 @@
           <a:chExt cx="0" cy="0"/>
         </a:xfrm>
       </p:grpSpPr>
-      <p:sp>
-        <p:nvSpPr>
-          <p:cNvPr id="2" name="제목 1"/>
-          <p:cNvSpPr>
-            <a:spLocks noGrp="1"/>
-          </p:cNvSpPr>
-          <p:nvPr>
-            <p:ph type="title" idx="0"/>
-          </p:nvPr>
-        </p:nvSpPr>
-        <p:spPr/>
-        <p:txBody>
-          <a:bodyPr/>
-          <a:p>
-            <a:pPr lvl="0">
-              <a:defRPr/>
-            </a:pPr>
-            <a:r>
-              <a:rPr lang="en-US" altLang="ko-KR"/>
-              <a:t>Color Psychology</a:t>
-            </a:r>
-            <a:endParaRPr lang="en-US" altLang="ko-KR"/>
-          </a:p>
-        </p:txBody>
-      </p:sp>
       <p:pic>
         <p:nvPicPr>
-          <p:cNvPr id="5" name=""/>
+          <p:cNvPr id="14" name=""/>
           <p:cNvPicPr>
             <a:picLocks noChangeAspect="1"/>
           </p:cNvPicPr>
           <p:nvPr/>
         </p:nvPicPr>
         <p:blipFill rotWithShape="1">
-          <a:blip r:embed="rId2"/>
+          <a:blip r:embed="rId3"/>
           <a:stretch>
             <a:fillRect/>
           </a:stretch>
         </p:blipFill>
         <p:spPr>
           <a:xfrm>
-            <a:off x="0" y="1083468"/>
-            <a:ext cx="6858000" cy="5143500"/>
+            <a:off x="-12390437" y="475059"/>
+            <a:ext cx="9906000" cy="3714750"/>
           </a:xfrm>
           <a:prstGeom prst="rect">
             <a:avLst/>
           </a:prstGeom>
         </p:spPr>
       </p:pic>
+      <p:pic>
+        <p:nvPicPr>
+          <p:cNvPr id="15" name=""/>
+          <p:cNvPicPr>
+            <a:picLocks noChangeAspect="1"/>
+          </p:cNvPicPr>
+          <p:nvPr/>
+        </p:nvPicPr>
+        <p:blipFill rotWithShape="1">
+          <a:blip r:embed="rId4"/>
+          <a:stretch>
+            <a:fillRect/>
+          </a:stretch>
+        </p:blipFill>
+        <p:spPr>
+          <a:xfrm>
+            <a:off x="-4247104" y="4889620"/>
+            <a:ext cx="2992582" cy="4488872"/>
+          </a:xfrm>
+          <a:prstGeom prst="rect">
+            <a:avLst/>
+          </a:prstGeom>
+        </p:spPr>
+      </p:pic>
+      <p:pic>
+        <p:nvPicPr>
+          <p:cNvPr id="16" name=""/>
+          <p:cNvPicPr>
+            <a:picLocks noChangeAspect="1"/>
+          </p:cNvPicPr>
+          <p:nvPr/>
+        </p:nvPicPr>
+        <p:blipFill rotWithShape="1">
+          <a:blip r:embed="rId5"/>
+          <a:stretch>
+            <a:fillRect/>
+          </a:stretch>
+        </p:blipFill>
+        <p:spPr>
+          <a:xfrm>
+            <a:off x="0" y="775389"/>
+            <a:ext cx="9906000" cy="3714750"/>
+          </a:xfrm>
+          <a:prstGeom prst="rect">
+            <a:avLst/>
+          </a:prstGeom>
+        </p:spPr>
+      </p:pic>
+      <p:pic>
+        <p:nvPicPr>
+          <p:cNvPr id="17" name=""/>
+          <p:cNvPicPr>
+            <a:picLocks noChangeAspect="1"/>
+          </p:cNvPicPr>
+          <p:nvPr/>
+        </p:nvPicPr>
+        <p:blipFill rotWithShape="1">
+          <a:blip r:embed="rId6"/>
+          <a:stretch>
+            <a:fillRect/>
+          </a:stretch>
+        </p:blipFill>
+        <p:spPr>
+          <a:xfrm>
+            <a:off x="-11160522" y="-285750"/>
+            <a:ext cx="9906000" cy="3714750"/>
+          </a:xfrm>
+          <a:prstGeom prst="rect">
+            <a:avLst/>
+          </a:prstGeom>
+        </p:spPr>
+      </p:pic>
+      <p:sp>
+        <p:nvSpPr>
+          <p:cNvPr id="5" name=""/>
+          <p:cNvSpPr txBox="1"/>
+          <p:nvPr/>
+        </p:nvSpPr>
+        <p:spPr>
+          <a:xfrm>
+            <a:off x="551565" y="169754"/>
+            <a:ext cx="2115052" cy="437941"/>
+          </a:xfrm>
+          <a:prstGeom prst="rect">
+            <a:avLst/>
+          </a:prstGeom>
+        </p:spPr>
+        <p:txBody>
+          <a:bodyPr wrap="square">
+            <a:spAutoFit/>
+          </a:bodyPr>
+          <a:p>
+            <a:pPr lvl="0">
+              <a:defRPr/>
+            </a:pPr>
+            <a:r>
+              <a:rPr lang="en-US" altLang="ko-KR" sz="2300" b="1">
+                <a:solidFill>
+                  <a:schemeClr val="lt1"/>
+                </a:solidFill>
+                <a:effectLst/>
+                <a:latin typeface="Limelight"/>
+                <a:cs typeface="Dubai Medium"/>
+              </a:rPr>
+              <a:t>musicor</a:t>
+            </a:r>
+            <a:endParaRPr lang="en-US" altLang="ko-KR" sz="2300" b="1">
+              <a:solidFill>
+                <a:schemeClr val="lt1"/>
+              </a:solidFill>
+              <a:effectLst/>
+              <a:latin typeface="Limelight"/>
+              <a:cs typeface="Dubai Medium"/>
+            </a:endParaRPr>
+          </a:p>
+        </p:txBody>
+      </p:sp>
+      <p:pic>
+        <p:nvPicPr>
+          <p:cNvPr id="19" name=""/>
+          <p:cNvPicPr>
+            <a:picLocks noChangeAspect="1"/>
+          </p:cNvPicPr>
+          <p:nvPr/>
+        </p:nvPicPr>
+        <p:blipFill rotWithShape="1">
+          <a:blip r:embed="rId7"/>
+          <a:stretch>
+            <a:fillRect/>
+          </a:stretch>
+        </p:blipFill>
+        <p:spPr>
+          <a:xfrm>
+            <a:off x="9378614" y="272136"/>
+            <a:ext cx="241503" cy="233176"/>
+          </a:xfrm>
+          <a:prstGeom prst="rect">
+            <a:avLst/>
+          </a:prstGeom>
+        </p:spPr>
+      </p:pic>
+      <p:pic>
+        <p:nvPicPr>
+          <p:cNvPr id="20" name=""/>
+          <p:cNvPicPr>
+            <a:picLocks noChangeAspect="1"/>
+          </p:cNvPicPr>
+          <p:nvPr/>
+        </p:nvPicPr>
+        <p:blipFill rotWithShape="1">
+          <a:blip r:embed="rId8"/>
+          <a:stretch>
+            <a:fillRect/>
+          </a:stretch>
+        </p:blipFill>
+        <p:spPr>
+          <a:xfrm>
+            <a:off x="227025" y="284123"/>
+            <a:ext cx="238815" cy="209202"/>
+          </a:xfrm>
+          <a:prstGeom prst="rect">
+            <a:avLst/>
+          </a:prstGeom>
+        </p:spPr>
+      </p:pic>
+      <p:sp>
+        <p:nvSpPr>
+          <p:cNvPr id="25" name=""/>
+          <p:cNvSpPr txBox="1"/>
+          <p:nvPr/>
+        </p:nvSpPr>
+        <p:spPr>
+          <a:xfrm>
+            <a:off x="346432" y="1673689"/>
+            <a:ext cx="5634820" cy="1918150"/>
+          </a:xfrm>
+          <a:prstGeom prst="rect">
+            <a:avLst/>
+          </a:prstGeom>
+        </p:spPr>
+        <p:txBody>
+          <a:bodyPr wrap="square">
+            <a:spAutoFit/>
+          </a:bodyPr>
+          <a:p>
+            <a:pPr lvl="0">
+              <a:defRPr/>
+            </a:pPr>
+            <a:r>
+              <a:rPr lang="en-US" altLang="ko-KR" sz="6000" b="1">
+                <a:latin typeface="Dubai"/>
+                <a:ea typeface="에스코어 드림 4 Regular"/>
+                <a:cs typeface="Dubai"/>
+              </a:rPr>
+              <a:t>MUSIC WITH</a:t>
+            </a:r>
+            <a:endParaRPr lang="en-US" altLang="ko-KR" sz="6000" b="1">
+              <a:latin typeface="Dubai"/>
+              <a:ea typeface="에스코어 드림 4 Regular"/>
+              <a:cs typeface="Dubai"/>
+            </a:endParaRPr>
+          </a:p>
+          <a:p>
+            <a:pPr lvl="0">
+              <a:defRPr/>
+            </a:pPr>
+            <a:r>
+              <a:rPr lang="en-US" altLang="ko-KR" sz="6000" b="1">
+                <a:latin typeface="Dubai"/>
+                <a:ea typeface="에스코어 드림 4 Regular"/>
+                <a:cs typeface="Dubai"/>
+              </a:rPr>
+              <a:t>COLOR</a:t>
+            </a:r>
+            <a:endParaRPr lang="en-US" altLang="ko-KR" sz="6000" b="1">
+              <a:latin typeface="Dubai"/>
+              <a:ea typeface="에스코어 드림 4 Regular"/>
+              <a:cs typeface="Dubai"/>
+            </a:endParaRPr>
+          </a:p>
+        </p:txBody>
+      </p:sp>
+      <p:grpSp>
+        <p:nvGrpSpPr>
+          <p:cNvPr id="30" name=""/>
+          <p:cNvGrpSpPr/>
+          <p:nvPr/>
+        </p:nvGrpSpPr>
+        <p:grpSpPr>
+          <a:xfrm rot="0">
+            <a:off x="551565" y="5513954"/>
+            <a:ext cx="8827048" cy="1344045"/>
+            <a:chOff x="551565" y="5731668"/>
+            <a:chExt cx="8827048" cy="1126331"/>
+          </a:xfrm>
+        </p:grpSpPr>
+        <p:sp>
+          <p:nvSpPr>
+            <p:cNvPr id="27" name=""/>
+            <p:cNvSpPr/>
+            <p:nvPr/>
+          </p:nvSpPr>
+          <p:spPr>
+            <a:xfrm>
+              <a:off x="551565" y="5731668"/>
+              <a:ext cx="2678906" cy="1126331"/>
+            </a:xfrm>
+            <a:prstGeom prst="round2SameRect">
+              <a:avLst>
+                <a:gd name="adj1" fmla="val 16667"/>
+                <a:gd name="adj2" fmla="val 0"/>
+              </a:avLst>
+            </a:prstGeom>
+            <a:solidFill>
+              <a:srgbClr val="808080"/>
+            </a:solidFill>
+            <a:ln>
+              <a:noFill/>
+            </a:ln>
+          </p:spPr>
+          <p:style>
+            <a:lnRef idx="2">
+              <a:schemeClr val="accent1">
+                <a:shade val="20000"/>
+              </a:schemeClr>
+            </a:lnRef>
+            <a:fillRef idx="1">
+              <a:schemeClr val="accent1"/>
+            </a:fillRef>
+            <a:effectRef idx="0">
+              <a:schemeClr val="accent1"/>
+            </a:effectRef>
+            <a:fontRef idx="minor">
+              <a:schemeClr val="lt1"/>
+            </a:fontRef>
+          </p:style>
+          <p:txBody>
+            <a:bodyPr anchor="ctr"/>
+            <a:p>
+              <a:pPr lvl="0" algn="ctr">
+                <a:defRPr/>
+              </a:pPr>
+              <a:endParaRPr lang="en-US" altLang="ko-KR"/>
+            </a:p>
+          </p:txBody>
+        </p:sp>
+        <p:sp>
+          <p:nvSpPr>
+            <p:cNvPr id="28" name=""/>
+            <p:cNvSpPr/>
+            <p:nvPr/>
+          </p:nvSpPr>
+          <p:spPr>
+            <a:xfrm>
+              <a:off x="3613547" y="5731668"/>
+              <a:ext cx="2678906" cy="1126331"/>
+            </a:xfrm>
+            <a:prstGeom prst="round2SameRect">
+              <a:avLst>
+                <a:gd name="adj1" fmla="val 16667"/>
+                <a:gd name="adj2" fmla="val 0"/>
+              </a:avLst>
+            </a:prstGeom>
+            <a:solidFill>
+              <a:srgbClr val="808080"/>
+            </a:solidFill>
+            <a:ln>
+              <a:noFill/>
+            </a:ln>
+          </p:spPr>
+          <p:style>
+            <a:lnRef idx="2">
+              <a:schemeClr val="accent1">
+                <a:shade val="20000"/>
+              </a:schemeClr>
+            </a:lnRef>
+            <a:fillRef idx="1">
+              <a:schemeClr val="accent1"/>
+            </a:fillRef>
+            <a:effectRef idx="0">
+              <a:schemeClr val="accent1"/>
+            </a:effectRef>
+            <a:fontRef idx="minor">
+              <a:schemeClr val="lt1"/>
+            </a:fontRef>
+          </p:style>
+          <p:txBody>
+            <a:bodyPr anchor="ctr"/>
+            <a:p>
+              <a:pPr lvl="0" algn="ctr">
+                <a:defRPr/>
+              </a:pPr>
+              <a:endParaRPr lang="en-US" altLang="ko-KR"/>
+            </a:p>
+          </p:txBody>
+        </p:sp>
+        <p:sp>
+          <p:nvSpPr>
+            <p:cNvPr id="29" name=""/>
+            <p:cNvSpPr/>
+            <p:nvPr/>
+          </p:nvSpPr>
+          <p:spPr>
+            <a:xfrm>
+              <a:off x="6699707" y="5731668"/>
+              <a:ext cx="2678906" cy="1126331"/>
+            </a:xfrm>
+            <a:prstGeom prst="round2SameRect">
+              <a:avLst>
+                <a:gd name="adj1" fmla="val 16667"/>
+                <a:gd name="adj2" fmla="val 0"/>
+              </a:avLst>
+            </a:prstGeom>
+            <a:solidFill>
+              <a:srgbClr val="808080"/>
+            </a:solidFill>
+            <a:ln>
+              <a:noFill/>
+            </a:ln>
+          </p:spPr>
+          <p:style>
+            <a:lnRef idx="2">
+              <a:schemeClr val="accent1">
+                <a:shade val="20000"/>
+              </a:schemeClr>
+            </a:lnRef>
+            <a:fillRef idx="1">
+              <a:schemeClr val="accent1"/>
+            </a:fillRef>
+            <a:effectRef idx="0">
+              <a:schemeClr val="accent1"/>
+            </a:effectRef>
+            <a:fontRef idx="minor">
+              <a:schemeClr val="lt1"/>
+            </a:fontRef>
+          </p:style>
+          <p:txBody>
+            <a:bodyPr anchor="ctr"/>
+            <a:p>
+              <a:pPr lvl="0" algn="ctr">
+                <a:defRPr/>
+              </a:pPr>
+              <a:endParaRPr lang="en-US" altLang="ko-KR"/>
+            </a:p>
+          </p:txBody>
+        </p:sp>
+      </p:grpSp>
+      <p:grpSp>
+        <p:nvGrpSpPr>
+          <p:cNvPr id="24" name=""/>
+          <p:cNvGrpSpPr/>
+          <p:nvPr/>
+        </p:nvGrpSpPr>
+        <p:grpSpPr>
+          <a:xfrm rot="0">
+            <a:off x="4841761" y="6467690"/>
+            <a:ext cx="222477" cy="241624"/>
+            <a:chOff x="5175249" y="6117647"/>
+            <a:chExt cx="222477" cy="241625"/>
+          </a:xfrm>
+        </p:grpSpPr>
+        <p:sp>
+          <p:nvSpPr>
+            <p:cNvPr id="22" name=""/>
+            <p:cNvSpPr/>
+            <p:nvPr/>
+          </p:nvSpPr>
+          <p:spPr>
+            <a:xfrm rot="5400000">
+              <a:off x="5213829" y="6175374"/>
+              <a:ext cx="145317" cy="222477"/>
+            </a:xfrm>
+            <a:prstGeom prst="chevron">
+              <a:avLst>
+                <a:gd name="adj" fmla="val 74023"/>
+              </a:avLst>
+            </a:prstGeom>
+            <a:solidFill>
+              <a:schemeClr val="lt1"/>
+            </a:solidFill>
+            <a:ln>
+              <a:noFill/>
+            </a:ln>
+          </p:spPr>
+          <p:style>
+            <a:lnRef idx="2">
+              <a:schemeClr val="accent1">
+                <a:shade val="20000"/>
+              </a:schemeClr>
+            </a:lnRef>
+            <a:fillRef idx="1">
+              <a:schemeClr val="accent1"/>
+            </a:fillRef>
+            <a:effectRef idx="0">
+              <a:schemeClr val="accent1"/>
+            </a:effectRef>
+            <a:fontRef idx="minor">
+              <a:schemeClr val="lt1"/>
+            </a:fontRef>
+          </p:style>
+          <p:txBody>
+            <a:bodyPr anchor="ctr"/>
+            <a:p>
+              <a:pPr lvl="0" algn="ctr">
+                <a:defRPr/>
+              </a:pPr>
+              <a:endParaRPr lang="en-US" altLang="ko-KR">
+                <a:solidFill>
+                  <a:schemeClr val="lt1"/>
+                </a:solidFill>
+              </a:endParaRPr>
+            </a:p>
+          </p:txBody>
+        </p:sp>
+        <p:sp>
+          <p:nvSpPr>
+            <p:cNvPr id="23" name=""/>
+            <p:cNvSpPr/>
+            <p:nvPr/>
+          </p:nvSpPr>
+          <p:spPr>
+            <a:xfrm rot="5400000">
+              <a:off x="5213829" y="6079067"/>
+              <a:ext cx="145317" cy="222477"/>
+            </a:xfrm>
+            <a:prstGeom prst="chevron">
+              <a:avLst>
+                <a:gd name="adj" fmla="val 74023"/>
+              </a:avLst>
+            </a:prstGeom>
+            <a:solidFill>
+              <a:schemeClr val="lt1"/>
+            </a:solidFill>
+            <a:ln>
+              <a:noFill/>
+            </a:ln>
+          </p:spPr>
+          <p:style>
+            <a:lnRef idx="2">
+              <a:schemeClr val="accent1">
+                <a:shade val="20000"/>
+              </a:schemeClr>
+            </a:lnRef>
+            <a:fillRef idx="1">
+              <a:schemeClr val="accent1"/>
+            </a:fillRef>
+            <a:effectRef idx="0">
+              <a:schemeClr val="accent1"/>
+            </a:effectRef>
+            <a:fontRef idx="minor">
+              <a:schemeClr val="lt1"/>
+            </a:fontRef>
+          </p:style>
+          <p:txBody>
+            <a:bodyPr anchor="ctr"/>
+            <a:p>
+              <a:pPr lvl="0" algn="ctr">
+                <a:defRPr/>
+              </a:pPr>
+              <a:endParaRPr lang="en-US" altLang="ko-KR">
+                <a:solidFill>
+                  <a:schemeClr val="lt1"/>
+                </a:solidFill>
+              </a:endParaRPr>
+            </a:p>
+          </p:txBody>
+        </p:sp>
+      </p:grpSp>
+      <p:sp>
+        <p:nvSpPr>
+          <p:cNvPr id="31" name=""/>
+          <p:cNvSpPr txBox="1"/>
+          <p:nvPr/>
+        </p:nvSpPr>
+        <p:spPr>
+          <a:xfrm>
+            <a:off x="0" y="4827798"/>
+            <a:ext cx="9906000" cy="389997"/>
+          </a:xfrm>
+          <a:prstGeom prst="rect">
+            <a:avLst/>
+          </a:prstGeom>
+        </p:spPr>
+        <p:txBody>
+          <a:bodyPr wrap="square">
+            <a:spAutoFit/>
+          </a:bodyPr>
+          <a:p>
+            <a:pPr lvl="0" algn="ctr">
+              <a:defRPr/>
+            </a:pPr>
+            <a:r>
+              <a:rPr lang="en-US" altLang="ko-KR" sz="2000" b="1">
+                <a:latin typeface="Dubai"/>
+                <a:ea typeface="에스코어 드림 4 Regular"/>
+                <a:cs typeface="Dubai"/>
+              </a:rPr>
+              <a:t>What is your color today ?</a:t>
+            </a:r>
+            <a:endParaRPr lang="en-US" altLang="ko-KR" sz="2000" b="1">
+              <a:latin typeface="Dubai"/>
+              <a:ea typeface="에스코어 드림 4 Regular"/>
+              <a:cs typeface="Dubai"/>
+            </a:endParaRPr>
+          </a:p>
+        </p:txBody>
+      </p:sp>
     </p:spTree>
     <p:extLst>
       <p:ext uri="{BB962C8B-B14F-4D97-AF65-F5344CB8AC3E}">
-        <p14:creationId xmlns:p14="http://schemas.microsoft.com/office/powerpoint/2010/main" val="1420474615"/>
+        <p14:creationId xmlns:p14="http://schemas.microsoft.com/office/powerpoint/2010/main" val="3555258107"/>
+      </p:ext>
+    </p:extLst>
+  </p:cSld>
+  <p:clrMapOvr>
+    <a:masterClrMapping/>
+  </p:clrMapOvr>
+  <mc:AlternateContent xmlns:mc="http://schemas.openxmlformats.org/markup-compatibility/2006">
+    <mc:Choice xmlns:p14="http://schemas.microsoft.com/office/powerpoint/2010/main" Requires="p14">
+      <p:transition xmlns:mc="http://schemas.openxmlformats.org/markup-compatibility/2006" xmlns:p14="http://schemas.microsoft.com/office/powerpoint/2010/main" mc:Ignorable="p14" p14:dur="500"/>
+    </mc:Choice>
+    <mc:Fallback>
+      <p:transition/>
+    </mc:Fallback>
+  </mc:AlternateContent>
+</p:sld>
+</file>
+
+<file path=ppt/slides/slide6.xml><?xml version="1.0" encoding="utf-8"?>
+<p:sld xmlns:r="http://schemas.openxmlformats.org/officeDocument/2006/relationships" xmlns:c="http://schemas.openxmlformats.org/drawingml/2006/chart" xmlns:a="http://schemas.openxmlformats.org/drawingml/2006/main" xmlns:dgm="http://schemas.openxmlformats.org/drawingml/2006/diagram" xmlns:dsp="http://schemas.microsoft.com/office/drawing/2008/diagram" xmlns:p="http://schemas.openxmlformats.org/presentationml/2006/main">
+  <p:cSld>
+    <p:spTree>
+      <p:nvGrpSpPr>
+        <p:cNvPr id="1" name=""/>
+        <p:cNvGrpSpPr/>
+        <p:nvPr/>
+      </p:nvGrpSpPr>
+      <p:grpSpPr>
+        <a:xfrm>
+          <a:off x="0" y="0"/>
+          <a:ext cx="0" cy="0"/>
+          <a:chOff x="0" y="0"/>
+          <a:chExt cx="0" cy="0"/>
+        </a:xfrm>
+      </p:grpSpPr>
+    </p:spTree>
+    <p:extLst>
+      <p:ext uri="{BB962C8B-B14F-4D97-AF65-F5344CB8AC3E}">
+        <p14:creationId xmlns:p14="http://schemas.microsoft.com/office/powerpoint/2010/main" val="253828030"/>
       </p:ext>
     </p:extLst>
   </p:cSld>

</xml_diff>